<commit_message>
added resort quick facts and created ski page folder
</commit_message>
<xml_diff>
--- a/my-website-storage/website-figures.pptx
+++ b/my-website-storage/website-figures.pptx
@@ -3297,60 +3297,2352 @@
           <a:chExt cx="0" cy="0"/>
         </a:xfrm>
       </p:grpSpPr>
-      <p:sp>
-        <p:nvSpPr>
-          <p:cNvPr id="2" name="Title 1">
-            <a:extLst>
-              <a:ext uri="{FF2B5EF4-FFF2-40B4-BE49-F238E27FC236}">
-                <a16:creationId xmlns:a16="http://schemas.microsoft.com/office/drawing/2014/main" id="{27058D09-EBC1-4A4D-BF3E-890A5C83B52D}"/>
-              </a:ext>
-            </a:extLst>
-          </p:cNvPr>
-          <p:cNvSpPr>
-            <a:spLocks noGrp="1"/>
-          </p:cNvSpPr>
-          <p:nvPr>
-            <p:ph type="ctrTitle"/>
-          </p:nvPr>
-        </p:nvSpPr>
-        <p:spPr/>
-        <p:txBody>
-          <a:bodyPr/>
-          <a:lstStyle/>
-          <a:p>
-            <a:endParaRPr lang="en-US"/>
-          </a:p>
-        </p:txBody>
-      </p:sp>
-      <p:sp>
-        <p:nvSpPr>
-          <p:cNvPr id="3" name="Subtitle 2">
-            <a:extLst>
-              <a:ext uri="{FF2B5EF4-FFF2-40B4-BE49-F238E27FC236}">
-                <a16:creationId xmlns:a16="http://schemas.microsoft.com/office/drawing/2014/main" id="{101E3BF2-E0A2-F646-894D-C92E98C5E0DA}"/>
-              </a:ext>
-            </a:extLst>
-          </p:cNvPr>
-          <p:cNvSpPr>
-            <a:spLocks noGrp="1"/>
-          </p:cNvSpPr>
-          <p:nvPr>
-            <p:ph type="subTitle" idx="1"/>
-          </p:nvPr>
-        </p:nvSpPr>
-        <p:spPr/>
-        <p:txBody>
-          <a:bodyPr/>
-          <a:lstStyle/>
-          <a:p>
-            <a:endParaRPr lang="en-US"/>
-          </a:p>
-        </p:txBody>
-      </p:sp>
+      <p:graphicFrame>
+        <p:nvGraphicFramePr>
+          <p:cNvPr id="2" name="Table 2">
+            <a:extLst>
+              <a:ext uri="{FF2B5EF4-FFF2-40B4-BE49-F238E27FC236}">
+                <a16:creationId xmlns:a16="http://schemas.microsoft.com/office/drawing/2014/main" id="{87A2817A-6058-494D-AC03-22E82780F214}"/>
+              </a:ext>
+            </a:extLst>
+          </p:cNvPr>
+          <p:cNvGraphicFramePr>
+            <a:graphicFrameLocks noGrp="1"/>
+          </p:cNvGraphicFramePr>
+          <p:nvPr>
+            <p:extLst>
+              <p:ext uri="{D42A27DB-BD31-4B8C-83A1-F6EECF244321}">
+                <p14:modId xmlns:p14="http://schemas.microsoft.com/office/powerpoint/2010/main" val="732702243"/>
+              </p:ext>
+            </p:extLst>
+          </p:nvPr>
+        </p:nvGraphicFramePr>
+        <p:xfrm>
+          <a:off x="-4" y="0"/>
+          <a:ext cx="12192004" cy="5599387"/>
+        </p:xfrm>
+        <a:graphic>
+          <a:graphicData uri="http://schemas.openxmlformats.org/drawingml/2006/table">
+            <a:tbl>
+              <a:tblPr firstRow="1" bandRow="1">
+                <a:tableStyleId>{5C22544A-7EE6-4342-B048-85BDC9FD1C3A}</a:tableStyleId>
+              </a:tblPr>
+              <a:tblGrid>
+                <a:gridCol w="1295404">
+                  <a:extLst>
+                    <a:ext uri="{9D8B030D-6E8A-4147-A177-3AD203B41FA5}">
+                      <a16:colId xmlns:a16="http://schemas.microsoft.com/office/drawing/2014/main" val="3592387597"/>
+                    </a:ext>
+                  </a:extLst>
+                </a:gridCol>
+                <a:gridCol w="1088571">
+                  <a:extLst>
+                    <a:ext uri="{9D8B030D-6E8A-4147-A177-3AD203B41FA5}">
+                      <a16:colId xmlns:a16="http://schemas.microsoft.com/office/drawing/2014/main" val="203949203"/>
+                    </a:ext>
+                  </a:extLst>
+                </a:gridCol>
+                <a:gridCol w="1023258">
+                  <a:extLst>
+                    <a:ext uri="{9D8B030D-6E8A-4147-A177-3AD203B41FA5}">
+                      <a16:colId xmlns:a16="http://schemas.microsoft.com/office/drawing/2014/main" val="2213014002"/>
+                    </a:ext>
+                  </a:extLst>
+                </a:gridCol>
+                <a:gridCol w="1230085">
+                  <a:extLst>
+                    <a:ext uri="{9D8B030D-6E8A-4147-A177-3AD203B41FA5}">
+                      <a16:colId xmlns:a16="http://schemas.microsoft.com/office/drawing/2014/main" val="1880636124"/>
+                    </a:ext>
+                  </a:extLst>
+                </a:gridCol>
+                <a:gridCol w="1186543">
+                  <a:extLst>
+                    <a:ext uri="{9D8B030D-6E8A-4147-A177-3AD203B41FA5}">
+                      <a16:colId xmlns:a16="http://schemas.microsoft.com/office/drawing/2014/main" val="1073551652"/>
+                    </a:ext>
+                  </a:extLst>
+                </a:gridCol>
+                <a:gridCol w="1175657">
+                  <a:extLst>
+                    <a:ext uri="{9D8B030D-6E8A-4147-A177-3AD203B41FA5}">
+                      <a16:colId xmlns:a16="http://schemas.microsoft.com/office/drawing/2014/main" val="3410832092"/>
+                    </a:ext>
+                  </a:extLst>
+                </a:gridCol>
+                <a:gridCol w="1034143">
+                  <a:extLst>
+                    <a:ext uri="{9D8B030D-6E8A-4147-A177-3AD203B41FA5}">
+                      <a16:colId xmlns:a16="http://schemas.microsoft.com/office/drawing/2014/main" val="2183261283"/>
+                    </a:ext>
+                  </a:extLst>
+                </a:gridCol>
+                <a:gridCol w="968829">
+                  <a:extLst>
+                    <a:ext uri="{9D8B030D-6E8A-4147-A177-3AD203B41FA5}">
+                      <a16:colId xmlns:a16="http://schemas.microsoft.com/office/drawing/2014/main" val="2670849998"/>
+                    </a:ext>
+                  </a:extLst>
+                </a:gridCol>
+                <a:gridCol w="1262743">
+                  <a:extLst>
+                    <a:ext uri="{9D8B030D-6E8A-4147-A177-3AD203B41FA5}">
+                      <a16:colId xmlns:a16="http://schemas.microsoft.com/office/drawing/2014/main" val="460033190"/>
+                    </a:ext>
+                  </a:extLst>
+                </a:gridCol>
+                <a:gridCol w="1001485">
+                  <a:extLst>
+                    <a:ext uri="{9D8B030D-6E8A-4147-A177-3AD203B41FA5}">
+                      <a16:colId xmlns:a16="http://schemas.microsoft.com/office/drawing/2014/main" val="3512559101"/>
+                    </a:ext>
+                  </a:extLst>
+                </a:gridCol>
+                <a:gridCol w="925286">
+                  <a:extLst>
+                    <a:ext uri="{9D8B030D-6E8A-4147-A177-3AD203B41FA5}">
+                      <a16:colId xmlns:a16="http://schemas.microsoft.com/office/drawing/2014/main" val="2226835496"/>
+                    </a:ext>
+                  </a:extLst>
+                </a:gridCol>
+              </a:tblGrid>
+              <a:tr h="805543">
+                <a:tc>
+                  <a:txBody>
+                    <a:bodyPr/>
+                    <a:lstStyle/>
+                    <a:p>
+                      <a:r>
+                        <a:rPr lang="en-US" sz="1600"/>
+                        <a:t>Resort</a:t>
+                      </a:r>
+                    </a:p>
+                  </a:txBody>
+                  <a:tcPr/>
+                </a:tc>
+                <a:tc>
+                  <a:txBody>
+                    <a:bodyPr/>
+                    <a:lstStyle/>
+                    <a:p>
+                      <a:r>
+                        <a:rPr lang="en-US" sz="1600"/>
+                        <a:t>Location</a:t>
+                      </a:r>
+                    </a:p>
+                  </a:txBody>
+                  <a:tcPr/>
+                </a:tc>
+                <a:tc>
+                  <a:txBody>
+                    <a:bodyPr/>
+                    <a:lstStyle/>
+                    <a:p>
+                      <a:pPr algn="r"/>
+                      <a:r>
+                        <a:rPr lang="en-US" sz="1600"/>
+                        <a:t>Annual snow fall (in)</a:t>
+                      </a:r>
+                    </a:p>
+                  </a:txBody>
+                  <a:tcPr/>
+                </a:tc>
+                <a:tc>
+                  <a:txBody>
+                    <a:bodyPr/>
+                    <a:lstStyle/>
+                    <a:p>
+                      <a:pPr algn="r"/>
+                      <a:r>
+                        <a:rPr lang="en-US" sz="1600"/>
+                        <a:t>Vertical (ft)</a:t>
+                      </a:r>
+                    </a:p>
+                  </a:txBody>
+                  <a:tcPr/>
+                </a:tc>
+                <a:tc>
+                  <a:txBody>
+                    <a:bodyPr/>
+                    <a:lstStyle/>
+                    <a:p>
+                      <a:pPr algn="r"/>
+                      <a:r>
+                        <a:rPr lang="en-US" sz="1600"/>
+                        <a:t>Base elevation (ft)</a:t>
+                      </a:r>
+                    </a:p>
+                  </a:txBody>
+                  <a:tcPr/>
+                </a:tc>
+                <a:tc>
+                  <a:txBody>
+                    <a:bodyPr/>
+                    <a:lstStyle/>
+                    <a:p>
+                      <a:pPr algn="r"/>
+                      <a:r>
+                        <a:rPr lang="en-US" sz="1600"/>
+                        <a:t>Top elevation (ft)</a:t>
+                      </a:r>
+                    </a:p>
+                  </a:txBody>
+                  <a:tcPr/>
+                </a:tc>
+                <a:tc>
+                  <a:txBody>
+                    <a:bodyPr/>
+                    <a:lstStyle/>
+                    <a:p>
+                      <a:pPr algn="r"/>
+                      <a:r>
+                        <a:rPr lang="en-US" sz="1600"/>
+                        <a:t>Skiable area</a:t>
+                      </a:r>
+                    </a:p>
+                  </a:txBody>
+                  <a:tcPr/>
+                </a:tc>
+                <a:tc>
+                  <a:txBody>
+                    <a:bodyPr/>
+                    <a:lstStyle/>
+                    <a:p>
+                      <a:pPr algn="r"/>
+                      <a:r>
+                        <a:rPr lang="en-US" sz="1600"/>
+                        <a:t>No. trails</a:t>
+                      </a:r>
+                    </a:p>
+                  </a:txBody>
+                  <a:tcPr/>
+                </a:tc>
+                <a:tc>
+                  <a:txBody>
+                    <a:bodyPr/>
+                    <a:lstStyle/>
+                    <a:p>
+                      <a:pPr algn="r"/>
+                      <a:r>
+                        <a:rPr lang="en-US" sz="1600"/>
+                        <a:t>Trail breakdown</a:t>
+                      </a:r>
+                    </a:p>
+                  </a:txBody>
+                  <a:tcPr/>
+                </a:tc>
+                <a:tc>
+                  <a:txBody>
+                    <a:bodyPr/>
+                    <a:lstStyle/>
+                    <a:p>
+                      <a:pPr algn="r"/>
+                      <a:r>
+                        <a:rPr lang="en-US" sz="1600"/>
+                        <a:t>No. lifts</a:t>
+                      </a:r>
+                    </a:p>
+                  </a:txBody>
+                  <a:tcPr/>
+                </a:tc>
+                <a:tc>
+                  <a:txBody>
+                    <a:bodyPr/>
+                    <a:lstStyle/>
+                    <a:p>
+                      <a:pPr algn="r"/>
+                      <a:r>
+                        <a:rPr lang="en-US" sz="1600"/>
+                        <a:t>Longest run (mi)</a:t>
+                      </a:r>
+                    </a:p>
+                  </a:txBody>
+                  <a:tcPr/>
+                </a:tc>
+                <a:extLst>
+                  <a:ext uri="{0D108BD9-81ED-4DB2-BD59-A6C34878D82A}">
+                    <a16:rowId xmlns:a16="http://schemas.microsoft.com/office/drawing/2014/main" val="3687794921"/>
+                  </a:ext>
+                </a:extLst>
+              </a:tr>
+              <a:tr h="413127">
+                <a:tc>
+                  <a:txBody>
+                    <a:bodyPr/>
+                    <a:lstStyle/>
+                    <a:p>
+                      <a:r>
+                        <a:rPr lang="en-US" sz="1600" b="1"/>
+                        <a:t>Revelstoke</a:t>
+                      </a:r>
+                    </a:p>
+                  </a:txBody>
+                  <a:tcPr/>
+                </a:tc>
+                <a:tc>
+                  <a:txBody>
+                    <a:bodyPr/>
+                    <a:lstStyle/>
+                    <a:p>
+                      <a:pPr rtl="0" fontAlgn="b"/>
+                      <a:r>
+                        <a:rPr lang="en-US" sz="1600" b="1">
+                          <a:effectLst/>
+                        </a:rPr>
+                        <a:t>BC, Canada</a:t>
+                      </a:r>
+                    </a:p>
+                  </a:txBody>
+                  <a:tcPr marL="28575" marR="28575" marT="19050" marB="19050" anchor="b"/>
+                </a:tc>
+                <a:tc>
+                  <a:txBody>
+                    <a:bodyPr/>
+                    <a:lstStyle/>
+                    <a:p>
+                      <a:pPr algn="r" rtl="0" fontAlgn="b"/>
+                      <a:r>
+                        <a:rPr lang="en-US" sz="1600" b="0">
+                          <a:effectLst/>
+                        </a:rPr>
+                        <a:t>413</a:t>
+                      </a:r>
+                    </a:p>
+                  </a:txBody>
+                  <a:tcPr marL="28575" marR="28575" marT="19050" marB="19050" anchor="b"/>
+                </a:tc>
+                <a:tc>
+                  <a:txBody>
+                    <a:bodyPr/>
+                    <a:lstStyle/>
+                    <a:p>
+                      <a:pPr algn="r" rtl="0" fontAlgn="b"/>
+                      <a:r>
+                        <a:rPr lang="en-US" sz="1600" b="0">
+                          <a:effectLst/>
+                        </a:rPr>
+                        <a:t>5620</a:t>
+                      </a:r>
+                    </a:p>
+                  </a:txBody>
+                  <a:tcPr marL="28575" marR="28575" marT="19050" marB="19050" anchor="b">
+                    <a:solidFill>
+                      <a:schemeClr val="accent1">
+                        <a:lumMod val="60000"/>
+                        <a:lumOff val="40000"/>
+                      </a:schemeClr>
+                    </a:solidFill>
+                  </a:tcPr>
+                </a:tc>
+                <a:tc>
+                  <a:txBody>
+                    <a:bodyPr/>
+                    <a:lstStyle/>
+                    <a:p>
+                      <a:pPr algn="r" rtl="0" fontAlgn="b"/>
+                      <a:r>
+                        <a:rPr lang="en-US" sz="1600" b="0">
+                          <a:effectLst/>
+                        </a:rPr>
+                        <a:t>1680</a:t>
+                      </a:r>
+                    </a:p>
+                  </a:txBody>
+                  <a:tcPr marL="28575" marR="28575" marT="19050" marB="19050" anchor="b"/>
+                </a:tc>
+                <a:tc>
+                  <a:txBody>
+                    <a:bodyPr/>
+                    <a:lstStyle/>
+                    <a:p>
+                      <a:pPr algn="r" rtl="0" fontAlgn="b"/>
+                      <a:r>
+                        <a:rPr lang="en-US" sz="1600" b="0">
+                          <a:effectLst/>
+                        </a:rPr>
+                        <a:t>7300</a:t>
+                      </a:r>
+                    </a:p>
+                  </a:txBody>
+                  <a:tcPr marL="28575" marR="28575" marT="19050" marB="19050" anchor="b"/>
+                </a:tc>
+                <a:tc>
+                  <a:txBody>
+                    <a:bodyPr/>
+                    <a:lstStyle/>
+                    <a:p>
+                      <a:pPr algn="r" rtl="0" fontAlgn="b"/>
+                      <a:r>
+                        <a:rPr lang="en-US" sz="1600" b="0">
+                          <a:effectLst/>
+                        </a:rPr>
+                        <a:t>3120</a:t>
+                      </a:r>
+                    </a:p>
+                  </a:txBody>
+                  <a:tcPr marL="28575" marR="28575" marT="19050" marB="19050" anchor="b"/>
+                </a:tc>
+                <a:tc>
+                  <a:txBody>
+                    <a:bodyPr/>
+                    <a:lstStyle/>
+                    <a:p>
+                      <a:pPr algn="r" rtl="0" fontAlgn="b"/>
+                      <a:r>
+                        <a:rPr lang="en-US" sz="1600" b="0">
+                          <a:effectLst/>
+                        </a:rPr>
+                        <a:t>40</a:t>
+                      </a:r>
+                    </a:p>
+                  </a:txBody>
+                  <a:tcPr marL="28575" marR="28575" marT="19050" marB="19050" anchor="b"/>
+                </a:tc>
+                <a:tc>
+                  <a:txBody>
+                    <a:bodyPr/>
+                    <a:lstStyle/>
+                    <a:p>
+                      <a:pPr algn="r" rtl="0" fontAlgn="b"/>
+                      <a:r>
+                        <a:rPr lang="en-US" sz="1600" b="0">
+                          <a:effectLst/>
+                        </a:rPr>
+                        <a:t>12/43/45</a:t>
+                      </a:r>
+                    </a:p>
+                  </a:txBody>
+                  <a:tcPr marL="28575" marR="28575" marT="19050" marB="19050" anchor="b"/>
+                </a:tc>
+                <a:tc>
+                  <a:txBody>
+                    <a:bodyPr/>
+                    <a:lstStyle/>
+                    <a:p>
+                      <a:pPr algn="r" rtl="0" fontAlgn="b"/>
+                      <a:r>
+                        <a:rPr lang="en-US" sz="1600" b="0">
+                          <a:effectLst/>
+                        </a:rPr>
+                        <a:t>5</a:t>
+                      </a:r>
+                    </a:p>
+                  </a:txBody>
+                  <a:tcPr marL="28575" marR="28575" marT="19050" marB="19050" anchor="b"/>
+                </a:tc>
+                <a:tc>
+                  <a:txBody>
+                    <a:bodyPr/>
+                    <a:lstStyle/>
+                    <a:p>
+                      <a:pPr algn="r" rtl="0" fontAlgn="b"/>
+                      <a:r>
+                        <a:rPr lang="en-US" sz="1600" b="0">
+                          <a:effectLst/>
+                        </a:rPr>
+                        <a:t>9.4</a:t>
+                      </a:r>
+                    </a:p>
+                  </a:txBody>
+                  <a:tcPr marL="28575" marR="28575" marT="19050" marB="19050" anchor="b">
+                    <a:solidFill>
+                      <a:schemeClr val="accent1">
+                        <a:lumMod val="60000"/>
+                        <a:lumOff val="40000"/>
+                      </a:schemeClr>
+                    </a:solidFill>
+                  </a:tcPr>
+                </a:tc>
+                <a:extLst>
+                  <a:ext uri="{0D108BD9-81ED-4DB2-BD59-A6C34878D82A}">
+                    <a16:rowId xmlns:a16="http://schemas.microsoft.com/office/drawing/2014/main" val="1826591722"/>
+                  </a:ext>
+                </a:extLst>
+              </a:tr>
+              <a:tr h="645157">
+                <a:tc>
+                  <a:txBody>
+                    <a:bodyPr/>
+                    <a:lstStyle/>
+                    <a:p>
+                      <a:r>
+                        <a:rPr lang="en-US" sz="1600" b="1"/>
+                        <a:t>Red Mountain </a:t>
+                      </a:r>
+                    </a:p>
+                  </a:txBody>
+                  <a:tcPr/>
+                </a:tc>
+                <a:tc>
+                  <a:txBody>
+                    <a:bodyPr/>
+                    <a:lstStyle/>
+                    <a:p>
+                      <a:pPr rtl="0" fontAlgn="b"/>
+                      <a:r>
+                        <a:rPr lang="en-US" sz="1600" b="1">
+                          <a:effectLst/>
+                        </a:rPr>
+                        <a:t>BC, Canada</a:t>
+                      </a:r>
+                    </a:p>
+                  </a:txBody>
+                  <a:tcPr marL="28575" marR="28575" marT="19050" marB="19050" anchor="b"/>
+                </a:tc>
+                <a:tc>
+                  <a:txBody>
+                    <a:bodyPr/>
+                    <a:lstStyle/>
+                    <a:p>
+                      <a:pPr algn="r" rtl="0" fontAlgn="b"/>
+                      <a:r>
+                        <a:rPr lang="en-US" sz="1600" b="0">
+                          <a:effectLst/>
+                        </a:rPr>
+                        <a:t>300</a:t>
+                      </a:r>
+                    </a:p>
+                  </a:txBody>
+                  <a:tcPr marL="28575" marR="28575" marT="19050" marB="19050" anchor="b"/>
+                </a:tc>
+                <a:tc>
+                  <a:txBody>
+                    <a:bodyPr/>
+                    <a:lstStyle/>
+                    <a:p>
+                      <a:pPr algn="r" rtl="0" fontAlgn="b"/>
+                      <a:r>
+                        <a:rPr lang="en-US" sz="1600" b="0">
+                          <a:effectLst/>
+                        </a:rPr>
+                        <a:t>2910</a:t>
+                      </a:r>
+                    </a:p>
+                  </a:txBody>
+                  <a:tcPr marL="28575" marR="28575" marT="19050" marB="19050" anchor="b"/>
+                </a:tc>
+                <a:tc>
+                  <a:txBody>
+                    <a:bodyPr/>
+                    <a:lstStyle/>
+                    <a:p>
+                      <a:pPr algn="r" rtl="0" fontAlgn="b"/>
+                      <a:r>
+                        <a:rPr lang="en-US" sz="1600" b="0">
+                          <a:effectLst/>
+                        </a:rPr>
+                        <a:t>3888</a:t>
+                      </a:r>
+                    </a:p>
+                  </a:txBody>
+                  <a:tcPr marL="28575" marR="28575" marT="19050" marB="19050" anchor="b"/>
+                </a:tc>
+                <a:tc>
+                  <a:txBody>
+                    <a:bodyPr/>
+                    <a:lstStyle/>
+                    <a:p>
+                      <a:pPr algn="r" rtl="0" fontAlgn="b"/>
+                      <a:r>
+                        <a:rPr lang="en-US" sz="1600" b="0">
+                          <a:effectLst/>
+                        </a:rPr>
+                        <a:t>6798</a:t>
+                      </a:r>
+                    </a:p>
+                  </a:txBody>
+                  <a:tcPr marL="28575" marR="28575" marT="19050" marB="19050" anchor="b"/>
+                </a:tc>
+                <a:tc>
+                  <a:txBody>
+                    <a:bodyPr/>
+                    <a:lstStyle/>
+                    <a:p>
+                      <a:pPr algn="r" rtl="0" fontAlgn="b"/>
+                      <a:r>
+                        <a:rPr lang="en-US" sz="1600" b="0">
+                          <a:effectLst/>
+                        </a:rPr>
+                        <a:t>2682</a:t>
+                      </a:r>
+                    </a:p>
+                  </a:txBody>
+                  <a:tcPr marL="28575" marR="28575" marT="19050" marB="19050" anchor="b"/>
+                </a:tc>
+                <a:tc>
+                  <a:txBody>
+                    <a:bodyPr/>
+                    <a:lstStyle/>
+                    <a:p>
+                      <a:pPr algn="r" rtl="0" fontAlgn="b"/>
+                      <a:r>
+                        <a:rPr lang="en-US" sz="1600" b="0">
+                          <a:effectLst/>
+                        </a:rPr>
+                        <a:t>110</a:t>
+                      </a:r>
+                    </a:p>
+                  </a:txBody>
+                  <a:tcPr marL="28575" marR="28575" marT="19050" marB="19050" anchor="b"/>
+                </a:tc>
+                <a:tc>
+                  <a:txBody>
+                    <a:bodyPr/>
+                    <a:lstStyle/>
+                    <a:p>
+                      <a:pPr algn="r" rtl="0" fontAlgn="b"/>
+                      <a:r>
+                        <a:rPr lang="en-US" sz="1600" b="0">
+                          <a:effectLst/>
+                        </a:rPr>
+                        <a:t>16/47/37</a:t>
+                      </a:r>
+                    </a:p>
+                  </a:txBody>
+                  <a:tcPr marL="28575" marR="28575" marT="19050" marB="19050" anchor="b"/>
+                </a:tc>
+                <a:tc>
+                  <a:txBody>
+                    <a:bodyPr/>
+                    <a:lstStyle/>
+                    <a:p>
+                      <a:pPr algn="r" rtl="0" fontAlgn="b"/>
+                      <a:r>
+                        <a:rPr lang="en-US" sz="1600" b="0">
+                          <a:effectLst/>
+                        </a:rPr>
+                        <a:t>6</a:t>
+                      </a:r>
+                    </a:p>
+                  </a:txBody>
+                  <a:tcPr marL="28575" marR="28575" marT="19050" marB="19050" anchor="b"/>
+                </a:tc>
+                <a:tc>
+                  <a:txBody>
+                    <a:bodyPr/>
+                    <a:lstStyle/>
+                    <a:p>
+                      <a:pPr algn="r" rtl="0" fontAlgn="b"/>
+                      <a:r>
+                        <a:rPr lang="en-US" sz="1600" b="0">
+                          <a:effectLst/>
+                        </a:rPr>
+                        <a:t>4.3</a:t>
+                      </a:r>
+                    </a:p>
+                  </a:txBody>
+                  <a:tcPr marL="28575" marR="28575" marT="19050" marB="19050" anchor="b"/>
+                </a:tc>
+                <a:extLst>
+                  <a:ext uri="{0D108BD9-81ED-4DB2-BD59-A6C34878D82A}">
+                    <a16:rowId xmlns:a16="http://schemas.microsoft.com/office/drawing/2014/main" val="3173246754"/>
+                  </a:ext>
+                </a:extLst>
+              </a:tr>
+              <a:tr h="413127">
+                <a:tc>
+                  <a:txBody>
+                    <a:bodyPr/>
+                    <a:lstStyle/>
+                    <a:p>
+                      <a:pPr rtl="0" fontAlgn="b"/>
+                      <a:r>
+                        <a:rPr lang="en-US" sz="1600" b="1">
+                          <a:effectLst/>
+                        </a:rPr>
+                        <a:t>Schweitzer</a:t>
+                      </a:r>
+                    </a:p>
+                  </a:txBody>
+                  <a:tcPr marL="28575" marR="28575" marT="19050" marB="19050" anchor="b"/>
+                </a:tc>
+                <a:tc>
+                  <a:txBody>
+                    <a:bodyPr/>
+                    <a:lstStyle/>
+                    <a:p>
+                      <a:pPr rtl="0" fontAlgn="b"/>
+                      <a:r>
+                        <a:rPr lang="en-US" sz="1600" b="1">
+                          <a:effectLst/>
+                        </a:rPr>
+                        <a:t>Idaho</a:t>
+                      </a:r>
+                    </a:p>
+                  </a:txBody>
+                  <a:tcPr marL="28575" marR="28575" marT="19050" marB="19050" anchor="b"/>
+                </a:tc>
+                <a:tc>
+                  <a:txBody>
+                    <a:bodyPr/>
+                    <a:lstStyle/>
+                    <a:p>
+                      <a:pPr algn="r" rtl="0" fontAlgn="b"/>
+                      <a:r>
+                        <a:rPr lang="en-US" sz="1600" b="0">
+                          <a:effectLst/>
+                        </a:rPr>
+                        <a:t>300</a:t>
+                      </a:r>
+                    </a:p>
+                  </a:txBody>
+                  <a:tcPr marL="28575" marR="28575" marT="19050" marB="19050" anchor="b"/>
+                </a:tc>
+                <a:tc>
+                  <a:txBody>
+                    <a:bodyPr/>
+                    <a:lstStyle/>
+                    <a:p>
+                      <a:pPr algn="r" rtl="0" fontAlgn="b"/>
+                      <a:r>
+                        <a:rPr lang="en-US" sz="1600" b="0">
+                          <a:effectLst/>
+                        </a:rPr>
+                        <a:t>2440</a:t>
+                      </a:r>
+                    </a:p>
+                  </a:txBody>
+                  <a:tcPr marL="28575" marR="28575" marT="19050" marB="19050" anchor="b"/>
+                </a:tc>
+                <a:tc>
+                  <a:txBody>
+                    <a:bodyPr/>
+                    <a:lstStyle/>
+                    <a:p>
+                      <a:pPr algn="r" rtl="0" fontAlgn="b"/>
+                      <a:r>
+                        <a:rPr lang="en-US" sz="1600" b="0">
+                          <a:effectLst/>
+                        </a:rPr>
+                        <a:t>3960</a:t>
+                      </a:r>
+                    </a:p>
+                  </a:txBody>
+                  <a:tcPr marL="28575" marR="28575" marT="19050" marB="19050" anchor="b"/>
+                </a:tc>
+                <a:tc>
+                  <a:txBody>
+                    <a:bodyPr/>
+                    <a:lstStyle/>
+                    <a:p>
+                      <a:pPr algn="r" rtl="0" fontAlgn="b"/>
+                      <a:r>
+                        <a:rPr lang="en-US" sz="1600" b="0">
+                          <a:effectLst/>
+                        </a:rPr>
+                        <a:t>6400</a:t>
+                      </a:r>
+                    </a:p>
+                  </a:txBody>
+                  <a:tcPr marL="28575" marR="28575" marT="19050" marB="19050" anchor="b"/>
+                </a:tc>
+                <a:tc>
+                  <a:txBody>
+                    <a:bodyPr/>
+                    <a:lstStyle/>
+                    <a:p>
+                      <a:pPr algn="r" rtl="0" fontAlgn="b"/>
+                      <a:r>
+                        <a:rPr lang="en-US" sz="1600" b="0">
+                          <a:effectLst/>
+                        </a:rPr>
+                        <a:t>2900</a:t>
+                      </a:r>
+                    </a:p>
+                  </a:txBody>
+                  <a:tcPr marL="28575" marR="28575" marT="19050" marB="19050" anchor="b"/>
+                </a:tc>
+                <a:tc>
+                  <a:txBody>
+                    <a:bodyPr/>
+                    <a:lstStyle/>
+                    <a:p>
+                      <a:pPr algn="r" rtl="0" fontAlgn="b"/>
+                      <a:r>
+                        <a:rPr lang="en-US" sz="1600" b="0">
+                          <a:effectLst/>
+                        </a:rPr>
+                        <a:t>92</a:t>
+                      </a:r>
+                    </a:p>
+                  </a:txBody>
+                  <a:tcPr marL="28575" marR="28575" marT="19050" marB="19050" anchor="b"/>
+                </a:tc>
+                <a:tc>
+                  <a:txBody>
+                    <a:bodyPr/>
+                    <a:lstStyle/>
+                    <a:p>
+                      <a:pPr algn="r" rtl="0" fontAlgn="b"/>
+                      <a:r>
+                        <a:rPr lang="en-US" sz="1600" b="0">
+                          <a:effectLst/>
+                        </a:rPr>
+                        <a:t>20/40/40</a:t>
+                      </a:r>
+                    </a:p>
+                  </a:txBody>
+                  <a:tcPr marL="28575" marR="28575" marT="19050" marB="19050" anchor="b"/>
+                </a:tc>
+                <a:tc>
+                  <a:txBody>
+                    <a:bodyPr/>
+                    <a:lstStyle/>
+                    <a:p>
+                      <a:pPr algn="r" rtl="0" fontAlgn="b"/>
+                      <a:r>
+                        <a:rPr lang="en-US" sz="1600" b="0">
+                          <a:effectLst/>
+                        </a:rPr>
+                        <a:t>10</a:t>
+                      </a:r>
+                    </a:p>
+                  </a:txBody>
+                  <a:tcPr marL="28575" marR="28575" marT="19050" marB="19050" anchor="b"/>
+                </a:tc>
+                <a:tc>
+                  <a:txBody>
+                    <a:bodyPr/>
+                    <a:lstStyle/>
+                    <a:p>
+                      <a:pPr algn="r" rtl="0" fontAlgn="b"/>
+                      <a:r>
+                        <a:rPr lang="en-US" sz="1600" b="0">
+                          <a:effectLst/>
+                        </a:rPr>
+                        <a:t>2.1</a:t>
+                      </a:r>
+                    </a:p>
+                  </a:txBody>
+                  <a:tcPr marL="28575" marR="28575" marT="19050" marB="19050" anchor="b"/>
+                </a:tc>
+                <a:extLst>
+                  <a:ext uri="{0D108BD9-81ED-4DB2-BD59-A6C34878D82A}">
+                    <a16:rowId xmlns:a16="http://schemas.microsoft.com/office/drawing/2014/main" val="3845109653"/>
+                  </a:ext>
+                </a:extLst>
+              </a:tr>
+              <a:tr h="413127">
+                <a:tc>
+                  <a:txBody>
+                    <a:bodyPr/>
+                    <a:lstStyle/>
+                    <a:p>
+                      <a:pPr rtl="0" fontAlgn="b"/>
+                      <a:r>
+                        <a:rPr lang="en-US" sz="1600" b="1">
+                          <a:effectLst/>
+                        </a:rPr>
+                        <a:t>Big Sky</a:t>
+                      </a:r>
+                    </a:p>
+                  </a:txBody>
+                  <a:tcPr marL="28575" marR="28575" marT="19050" marB="19050" anchor="b"/>
+                </a:tc>
+                <a:tc>
+                  <a:txBody>
+                    <a:bodyPr/>
+                    <a:lstStyle/>
+                    <a:p>
+                      <a:pPr rtl="0" fontAlgn="b"/>
+                      <a:r>
+                        <a:rPr lang="en-US" sz="1600" b="1">
+                          <a:effectLst/>
+                        </a:rPr>
+                        <a:t>Montana</a:t>
+                      </a:r>
+                    </a:p>
+                  </a:txBody>
+                  <a:tcPr marL="28575" marR="28575" marT="19050" marB="19050" anchor="b"/>
+                </a:tc>
+                <a:tc>
+                  <a:txBody>
+                    <a:bodyPr/>
+                    <a:lstStyle/>
+                    <a:p>
+                      <a:pPr algn="r" rtl="0" fontAlgn="b"/>
+                      <a:r>
+                        <a:rPr lang="en-US" sz="1600" b="0">
+                          <a:effectLst/>
+                        </a:rPr>
+                        <a:t>400</a:t>
+                      </a:r>
+                    </a:p>
+                  </a:txBody>
+                  <a:tcPr marL="28575" marR="28575" marT="19050" marB="19050" anchor="b"/>
+                </a:tc>
+                <a:tc>
+                  <a:txBody>
+                    <a:bodyPr/>
+                    <a:lstStyle/>
+                    <a:p>
+                      <a:pPr algn="r" rtl="0" fontAlgn="b"/>
+                      <a:r>
+                        <a:rPr lang="en-US" sz="1600" b="0">
+                          <a:effectLst/>
+                        </a:rPr>
+                        <a:t>4350</a:t>
+                      </a:r>
+                    </a:p>
+                  </a:txBody>
+                  <a:tcPr marL="28575" marR="28575" marT="19050" marB="19050" anchor="b"/>
+                </a:tc>
+                <a:tc>
+                  <a:txBody>
+                    <a:bodyPr/>
+                    <a:lstStyle/>
+                    <a:p>
+                      <a:pPr algn="r" rtl="0" fontAlgn="b"/>
+                      <a:r>
+                        <a:rPr lang="en-US" sz="1600" b="0">
+                          <a:effectLst/>
+                        </a:rPr>
+                        <a:t>6800</a:t>
+                      </a:r>
+                    </a:p>
+                  </a:txBody>
+                  <a:tcPr marL="28575" marR="28575" marT="19050" marB="19050" anchor="b"/>
+                </a:tc>
+                <a:tc>
+                  <a:txBody>
+                    <a:bodyPr/>
+                    <a:lstStyle/>
+                    <a:p>
+                      <a:pPr algn="r" rtl="0" fontAlgn="b"/>
+                      <a:r>
+                        <a:rPr lang="en-US" sz="1600" b="0">
+                          <a:effectLst/>
+                        </a:rPr>
+                        <a:t>11166</a:t>
+                      </a:r>
+                    </a:p>
+                  </a:txBody>
+                  <a:tcPr marL="28575" marR="28575" marT="19050" marB="19050" anchor="b">
+                    <a:solidFill>
+                      <a:schemeClr val="accent1">
+                        <a:lumMod val="60000"/>
+                        <a:lumOff val="40000"/>
+                      </a:schemeClr>
+                    </a:solidFill>
+                  </a:tcPr>
+                </a:tc>
+                <a:tc>
+                  <a:txBody>
+                    <a:bodyPr/>
+                    <a:lstStyle/>
+                    <a:p>
+                      <a:pPr algn="r" rtl="0" fontAlgn="b"/>
+                      <a:r>
+                        <a:rPr lang="en-US" sz="1600" b="0">
+                          <a:effectLst/>
+                        </a:rPr>
+                        <a:t>5800</a:t>
+                      </a:r>
+                    </a:p>
+                  </a:txBody>
+                  <a:tcPr marL="28575" marR="28575" marT="19050" marB="19050" anchor="b">
+                    <a:solidFill>
+                      <a:schemeClr val="accent1">
+                        <a:lumMod val="60000"/>
+                        <a:lumOff val="40000"/>
+                      </a:schemeClr>
+                    </a:solidFill>
+                  </a:tcPr>
+                </a:tc>
+                <a:tc>
+                  <a:txBody>
+                    <a:bodyPr/>
+                    <a:lstStyle/>
+                    <a:p>
+                      <a:pPr algn="r" rtl="0" fontAlgn="b"/>
+                      <a:r>
+                        <a:rPr lang="en-US" sz="1600" b="0">
+                          <a:effectLst/>
+                        </a:rPr>
+                        <a:t>250</a:t>
+                      </a:r>
+                    </a:p>
+                  </a:txBody>
+                  <a:tcPr marL="28575" marR="28575" marT="19050" marB="19050" anchor="b">
+                    <a:solidFill>
+                      <a:schemeClr val="accent1">
+                        <a:lumMod val="60000"/>
+                        <a:lumOff val="40000"/>
+                      </a:schemeClr>
+                    </a:solidFill>
+                  </a:tcPr>
+                </a:tc>
+                <a:tc>
+                  <a:txBody>
+                    <a:bodyPr/>
+                    <a:lstStyle/>
+                    <a:p>
+                      <a:pPr algn="r" rtl="0" fontAlgn="b"/>
+                      <a:r>
+                        <a:rPr lang="en-US" sz="1600" b="0">
+                          <a:effectLst/>
+                        </a:rPr>
+                        <a:t>15/25/60</a:t>
+                      </a:r>
+                    </a:p>
+                  </a:txBody>
+                  <a:tcPr marL="28575" marR="28575" marT="19050" marB="19050" anchor="b">
+                    <a:solidFill>
+                      <a:schemeClr val="accent1">
+                        <a:lumMod val="60000"/>
+                        <a:lumOff val="40000"/>
+                      </a:schemeClr>
+                    </a:solidFill>
+                  </a:tcPr>
+                </a:tc>
+                <a:tc>
+                  <a:txBody>
+                    <a:bodyPr/>
+                    <a:lstStyle/>
+                    <a:p>
+                      <a:pPr algn="r" rtl="0" fontAlgn="b"/>
+                      <a:r>
+                        <a:rPr lang="en-US" sz="1600" b="0">
+                          <a:effectLst/>
+                        </a:rPr>
+                        <a:t>36</a:t>
+                      </a:r>
+                    </a:p>
+                  </a:txBody>
+                  <a:tcPr marL="28575" marR="28575" marT="19050" marB="19050" anchor="b">
+                    <a:solidFill>
+                      <a:schemeClr val="accent1">
+                        <a:lumMod val="60000"/>
+                        <a:lumOff val="40000"/>
+                      </a:schemeClr>
+                    </a:solidFill>
+                  </a:tcPr>
+                </a:tc>
+                <a:tc>
+                  <a:txBody>
+                    <a:bodyPr/>
+                    <a:lstStyle/>
+                    <a:p>
+                      <a:pPr algn="r" rtl="0" fontAlgn="b"/>
+                      <a:r>
+                        <a:rPr lang="en-US" sz="1600" b="0">
+                          <a:effectLst/>
+                        </a:rPr>
+                        <a:t>6</a:t>
+                      </a:r>
+                    </a:p>
+                  </a:txBody>
+                  <a:tcPr marL="28575" marR="28575" marT="19050" marB="19050" anchor="b"/>
+                </a:tc>
+                <a:extLst>
+                  <a:ext uri="{0D108BD9-81ED-4DB2-BD59-A6C34878D82A}">
+                    <a16:rowId xmlns:a16="http://schemas.microsoft.com/office/drawing/2014/main" val="4172198563"/>
+                  </a:ext>
+                </a:extLst>
+              </a:tr>
+              <a:tr h="413127">
+                <a:tc>
+                  <a:txBody>
+                    <a:bodyPr/>
+                    <a:lstStyle/>
+                    <a:p>
+                      <a:pPr rtl="0" fontAlgn="b"/>
+                      <a:r>
+                        <a:rPr lang="en-US" sz="1600" b="1">
+                          <a:effectLst/>
+                        </a:rPr>
+                        <a:t>Jackson Hole</a:t>
+                      </a:r>
+                    </a:p>
+                  </a:txBody>
+                  <a:tcPr marL="28575" marR="28575" marT="19050" marB="19050" anchor="b"/>
+                </a:tc>
+                <a:tc>
+                  <a:txBody>
+                    <a:bodyPr/>
+                    <a:lstStyle/>
+                    <a:p>
+                      <a:pPr rtl="0" fontAlgn="b"/>
+                      <a:r>
+                        <a:rPr lang="en-US" sz="1600" b="1">
+                          <a:effectLst/>
+                        </a:rPr>
+                        <a:t>Wyoming</a:t>
+                      </a:r>
+                    </a:p>
+                  </a:txBody>
+                  <a:tcPr marL="28575" marR="28575" marT="19050" marB="19050" anchor="b"/>
+                </a:tc>
+                <a:tc>
+                  <a:txBody>
+                    <a:bodyPr/>
+                    <a:lstStyle/>
+                    <a:p>
+                      <a:pPr algn="r" rtl="0" fontAlgn="b"/>
+                      <a:r>
+                        <a:rPr lang="en-US" sz="1600" b="0">
+                          <a:effectLst/>
+                        </a:rPr>
+                        <a:t>459</a:t>
+                      </a:r>
+                    </a:p>
+                  </a:txBody>
+                  <a:tcPr marL="28575" marR="28575" marT="19050" marB="19050" anchor="b"/>
+                </a:tc>
+                <a:tc>
+                  <a:txBody>
+                    <a:bodyPr/>
+                    <a:lstStyle/>
+                    <a:p>
+                      <a:pPr algn="r" rtl="0" fontAlgn="b"/>
+                      <a:r>
+                        <a:rPr lang="en-US" sz="1600" b="0">
+                          <a:effectLst/>
+                        </a:rPr>
+                        <a:t>4139</a:t>
+                      </a:r>
+                    </a:p>
+                  </a:txBody>
+                  <a:tcPr marL="28575" marR="28575" marT="19050" marB="19050" anchor="b"/>
+                </a:tc>
+                <a:tc>
+                  <a:txBody>
+                    <a:bodyPr/>
+                    <a:lstStyle/>
+                    <a:p>
+                      <a:pPr algn="r" rtl="0" fontAlgn="b"/>
+                      <a:r>
+                        <a:rPr lang="en-US" sz="1600" b="0">
+                          <a:effectLst/>
+                        </a:rPr>
+                        <a:t>6311</a:t>
+                      </a:r>
+                    </a:p>
+                  </a:txBody>
+                  <a:tcPr marL="28575" marR="28575" marT="19050" marB="19050" anchor="b"/>
+                </a:tc>
+                <a:tc>
+                  <a:txBody>
+                    <a:bodyPr/>
+                    <a:lstStyle/>
+                    <a:p>
+                      <a:pPr algn="r" rtl="0" fontAlgn="b"/>
+                      <a:r>
+                        <a:rPr lang="en-US" sz="1600" b="0">
+                          <a:effectLst/>
+                        </a:rPr>
+                        <a:t>10450</a:t>
+                      </a:r>
+                    </a:p>
+                  </a:txBody>
+                  <a:tcPr marL="28575" marR="28575" marT="19050" marB="19050" anchor="b"/>
+                </a:tc>
+                <a:tc>
+                  <a:txBody>
+                    <a:bodyPr/>
+                    <a:lstStyle/>
+                    <a:p>
+                      <a:pPr algn="r" rtl="0" fontAlgn="b"/>
+                      <a:r>
+                        <a:rPr lang="en-US" sz="1600" b="0">
+                          <a:effectLst/>
+                        </a:rPr>
+                        <a:t>2500</a:t>
+                      </a:r>
+                    </a:p>
+                  </a:txBody>
+                  <a:tcPr marL="28575" marR="28575" marT="19050" marB="19050" anchor="b"/>
+                </a:tc>
+                <a:tc>
+                  <a:txBody>
+                    <a:bodyPr/>
+                    <a:lstStyle/>
+                    <a:p>
+                      <a:pPr algn="r" rtl="0" fontAlgn="b"/>
+                      <a:r>
+                        <a:rPr lang="en-US" sz="1600" b="0">
+                          <a:effectLst/>
+                        </a:rPr>
+                        <a:t>116</a:t>
+                      </a:r>
+                    </a:p>
+                  </a:txBody>
+                  <a:tcPr marL="28575" marR="28575" marT="19050" marB="19050" anchor="b"/>
+                </a:tc>
+                <a:tc>
+                  <a:txBody>
+                    <a:bodyPr/>
+                    <a:lstStyle/>
+                    <a:p>
+                      <a:pPr algn="r" rtl="0" fontAlgn="b"/>
+                      <a:r>
+                        <a:rPr lang="en-US" sz="1600" b="0">
+                          <a:effectLst/>
+                        </a:rPr>
+                        <a:t>10/40/50</a:t>
+                      </a:r>
+                    </a:p>
+                  </a:txBody>
+                  <a:tcPr marL="28575" marR="28575" marT="19050" marB="19050" anchor="b"/>
+                </a:tc>
+                <a:tc>
+                  <a:txBody>
+                    <a:bodyPr/>
+                    <a:lstStyle/>
+                    <a:p>
+                      <a:pPr algn="r" rtl="0" fontAlgn="b"/>
+                      <a:r>
+                        <a:rPr lang="en-US" sz="1600" b="0">
+                          <a:effectLst/>
+                        </a:rPr>
+                        <a:t>13</a:t>
+                      </a:r>
+                    </a:p>
+                  </a:txBody>
+                  <a:tcPr marL="28575" marR="28575" marT="19050" marB="19050" anchor="b"/>
+                </a:tc>
+                <a:tc>
+                  <a:txBody>
+                    <a:bodyPr/>
+                    <a:lstStyle/>
+                    <a:p>
+                      <a:pPr algn="r" rtl="0" fontAlgn="b"/>
+                      <a:r>
+                        <a:rPr lang="en-US" sz="1600" b="0">
+                          <a:effectLst/>
+                        </a:rPr>
+                        <a:t>4.5</a:t>
+                      </a:r>
+                    </a:p>
+                  </a:txBody>
+                  <a:tcPr marL="28575" marR="28575" marT="19050" marB="19050" anchor="b"/>
+                </a:tc>
+                <a:extLst>
+                  <a:ext uri="{0D108BD9-81ED-4DB2-BD59-A6C34878D82A}">
+                    <a16:rowId xmlns:a16="http://schemas.microsoft.com/office/drawing/2014/main" val="2381757899"/>
+                  </a:ext>
+                </a:extLst>
+              </a:tr>
+              <a:tr h="413127">
+                <a:tc>
+                  <a:txBody>
+                    <a:bodyPr/>
+                    <a:lstStyle/>
+                    <a:p>
+                      <a:pPr rtl="0" fontAlgn="b"/>
+                      <a:r>
+                        <a:rPr lang="en-US" sz="1600" b="1">
+                          <a:effectLst/>
+                        </a:rPr>
+                        <a:t>Alta</a:t>
+                      </a:r>
+                    </a:p>
+                  </a:txBody>
+                  <a:tcPr marL="28575" marR="28575" marT="19050" marB="19050" anchor="b"/>
+                </a:tc>
+                <a:tc>
+                  <a:txBody>
+                    <a:bodyPr/>
+                    <a:lstStyle/>
+                    <a:p>
+                      <a:pPr rtl="0" fontAlgn="b"/>
+                      <a:r>
+                        <a:rPr lang="en-US" sz="1600" b="1">
+                          <a:effectLst/>
+                        </a:rPr>
+                        <a:t>Utah</a:t>
+                      </a:r>
+                    </a:p>
+                  </a:txBody>
+                  <a:tcPr marL="28575" marR="28575" marT="19050" marB="19050" anchor="b"/>
+                </a:tc>
+                <a:tc>
+                  <a:txBody>
+                    <a:bodyPr/>
+                    <a:lstStyle/>
+                    <a:p>
+                      <a:pPr algn="r" rtl="0" fontAlgn="b"/>
+                      <a:r>
+                        <a:rPr lang="en-US" sz="1600" b="0">
+                          <a:effectLst/>
+                        </a:rPr>
+                        <a:t>545</a:t>
+                      </a:r>
+                    </a:p>
+                  </a:txBody>
+                  <a:tcPr marL="28575" marR="28575" marT="19050" marB="19050" anchor="b">
+                    <a:solidFill>
+                      <a:schemeClr val="accent1">
+                        <a:lumMod val="60000"/>
+                        <a:lumOff val="40000"/>
+                      </a:schemeClr>
+                    </a:solidFill>
+                  </a:tcPr>
+                </a:tc>
+                <a:tc>
+                  <a:txBody>
+                    <a:bodyPr/>
+                    <a:lstStyle/>
+                    <a:p>
+                      <a:pPr algn="r" rtl="0" fontAlgn="b"/>
+                      <a:r>
+                        <a:rPr lang="en-US" sz="1600" b="0">
+                          <a:effectLst/>
+                        </a:rPr>
+                        <a:t>2538</a:t>
+                      </a:r>
+                    </a:p>
+                  </a:txBody>
+                  <a:tcPr marL="28575" marR="28575" marT="19050" marB="19050" anchor="b"/>
+                </a:tc>
+                <a:tc>
+                  <a:txBody>
+                    <a:bodyPr/>
+                    <a:lstStyle/>
+                    <a:p>
+                      <a:pPr algn="r" rtl="0" fontAlgn="b"/>
+                      <a:r>
+                        <a:rPr lang="en-US" sz="1600" b="0">
+                          <a:effectLst/>
+                        </a:rPr>
+                        <a:t>8530</a:t>
+                      </a:r>
+                    </a:p>
+                  </a:txBody>
+                  <a:tcPr marL="28575" marR="28575" marT="19050" marB="19050" anchor="b"/>
+                </a:tc>
+                <a:tc>
+                  <a:txBody>
+                    <a:bodyPr/>
+                    <a:lstStyle/>
+                    <a:p>
+                      <a:pPr algn="r" rtl="0" fontAlgn="b"/>
+                      <a:r>
+                        <a:rPr lang="en-US" sz="1600" b="0">
+                          <a:effectLst/>
+                        </a:rPr>
+                        <a:t>11068</a:t>
+                      </a:r>
+                    </a:p>
+                  </a:txBody>
+                  <a:tcPr marL="28575" marR="28575" marT="19050" marB="19050" anchor="b"/>
+                </a:tc>
+                <a:tc>
+                  <a:txBody>
+                    <a:bodyPr/>
+                    <a:lstStyle/>
+                    <a:p>
+                      <a:pPr algn="r" rtl="0" fontAlgn="b"/>
+                      <a:r>
+                        <a:rPr lang="en-US" sz="1600" b="0">
+                          <a:effectLst/>
+                        </a:rPr>
+                        <a:t>2614</a:t>
+                      </a:r>
+                    </a:p>
+                  </a:txBody>
+                  <a:tcPr marL="28575" marR="28575" marT="19050" marB="19050" anchor="b"/>
+                </a:tc>
+                <a:tc>
+                  <a:txBody>
+                    <a:bodyPr/>
+                    <a:lstStyle/>
+                    <a:p>
+                      <a:pPr algn="r" rtl="0" fontAlgn="b"/>
+                      <a:r>
+                        <a:rPr lang="en-US" sz="1600" b="0">
+                          <a:effectLst/>
+                        </a:rPr>
+                        <a:t>116</a:t>
+                      </a:r>
+                    </a:p>
+                  </a:txBody>
+                  <a:tcPr marL="28575" marR="28575" marT="19050" marB="19050" anchor="b"/>
+                </a:tc>
+                <a:tc>
+                  <a:txBody>
+                    <a:bodyPr/>
+                    <a:lstStyle/>
+                    <a:p>
+                      <a:pPr algn="r" rtl="0" fontAlgn="b"/>
+                      <a:r>
+                        <a:rPr lang="en-US" sz="1600" b="0">
+                          <a:effectLst/>
+                        </a:rPr>
+                        <a:t>15/30/55</a:t>
+                      </a:r>
+                    </a:p>
+                  </a:txBody>
+                  <a:tcPr marL="28575" marR="28575" marT="19050" marB="19050" anchor="b"/>
+                </a:tc>
+                <a:tc>
+                  <a:txBody>
+                    <a:bodyPr/>
+                    <a:lstStyle/>
+                    <a:p>
+                      <a:pPr algn="r" rtl="0" fontAlgn="b"/>
+                      <a:r>
+                        <a:rPr lang="en-US" sz="1600" b="0">
+                          <a:effectLst/>
+                        </a:rPr>
+                        <a:t>6</a:t>
+                      </a:r>
+                    </a:p>
+                  </a:txBody>
+                  <a:tcPr marL="28575" marR="28575" marT="19050" marB="19050" anchor="b"/>
+                </a:tc>
+                <a:tc>
+                  <a:txBody>
+                    <a:bodyPr/>
+                    <a:lstStyle/>
+                    <a:p>
+                      <a:pPr algn="r" rtl="0" fontAlgn="b"/>
+                      <a:r>
+                        <a:rPr lang="en-US" sz="1600" b="0">
+                          <a:effectLst/>
+                        </a:rPr>
+                        <a:t>1.3</a:t>
+                      </a:r>
+                    </a:p>
+                  </a:txBody>
+                  <a:tcPr marL="28575" marR="28575" marT="19050" marB="19050" anchor="b"/>
+                </a:tc>
+                <a:extLst>
+                  <a:ext uri="{0D108BD9-81ED-4DB2-BD59-A6C34878D82A}">
+                    <a16:rowId xmlns:a16="http://schemas.microsoft.com/office/drawing/2014/main" val="486704418"/>
+                  </a:ext>
+                </a:extLst>
+              </a:tr>
+              <a:tr h="413127">
+                <a:tc>
+                  <a:txBody>
+                    <a:bodyPr/>
+                    <a:lstStyle/>
+                    <a:p>
+                      <a:pPr rtl="0" fontAlgn="b"/>
+                      <a:r>
+                        <a:rPr lang="en-US" sz="1600" b="1">
+                          <a:effectLst/>
+                        </a:rPr>
+                        <a:t>Snowbird</a:t>
+                      </a:r>
+                    </a:p>
+                  </a:txBody>
+                  <a:tcPr marL="28575" marR="28575" marT="19050" marB="19050" anchor="b"/>
+                </a:tc>
+                <a:tc>
+                  <a:txBody>
+                    <a:bodyPr/>
+                    <a:lstStyle/>
+                    <a:p>
+                      <a:pPr rtl="0" fontAlgn="b"/>
+                      <a:r>
+                        <a:rPr lang="en-US" sz="1600" b="1">
+                          <a:effectLst/>
+                        </a:rPr>
+                        <a:t>Utah</a:t>
+                      </a:r>
+                    </a:p>
+                  </a:txBody>
+                  <a:tcPr marL="28575" marR="28575" marT="19050" marB="19050" anchor="b"/>
+                </a:tc>
+                <a:tc>
+                  <a:txBody>
+                    <a:bodyPr/>
+                    <a:lstStyle/>
+                    <a:p>
+                      <a:pPr algn="r" rtl="0" fontAlgn="b"/>
+                      <a:r>
+                        <a:rPr lang="en-US" sz="1600" b="0">
+                          <a:effectLst/>
+                        </a:rPr>
+                        <a:t>500</a:t>
+                      </a:r>
+                    </a:p>
+                  </a:txBody>
+                  <a:tcPr marL="28575" marR="28575" marT="19050" marB="19050" anchor="b"/>
+                </a:tc>
+                <a:tc>
+                  <a:txBody>
+                    <a:bodyPr/>
+                    <a:lstStyle/>
+                    <a:p>
+                      <a:pPr algn="r" rtl="0" fontAlgn="b"/>
+                      <a:r>
+                        <a:rPr lang="en-US" sz="1600" b="0">
+                          <a:effectLst/>
+                        </a:rPr>
+                        <a:t>3240</a:t>
+                      </a:r>
+                    </a:p>
+                  </a:txBody>
+                  <a:tcPr marL="28575" marR="28575" marT="19050" marB="19050" anchor="b"/>
+                </a:tc>
+                <a:tc>
+                  <a:txBody>
+                    <a:bodyPr/>
+                    <a:lstStyle/>
+                    <a:p>
+                      <a:pPr algn="r" rtl="0" fontAlgn="b"/>
+                      <a:r>
+                        <a:rPr lang="en-US" sz="1600" b="0">
+                          <a:effectLst/>
+                        </a:rPr>
+                        <a:t>7760</a:t>
+                      </a:r>
+                    </a:p>
+                  </a:txBody>
+                  <a:tcPr marL="28575" marR="28575" marT="19050" marB="19050" anchor="b"/>
+                </a:tc>
+                <a:tc>
+                  <a:txBody>
+                    <a:bodyPr/>
+                    <a:lstStyle/>
+                    <a:p>
+                      <a:pPr algn="r" rtl="0" fontAlgn="b"/>
+                      <a:r>
+                        <a:rPr lang="en-US" sz="1600" b="0">
+                          <a:effectLst/>
+                        </a:rPr>
+                        <a:t>11000</a:t>
+                      </a:r>
+                    </a:p>
+                  </a:txBody>
+                  <a:tcPr marL="28575" marR="28575" marT="19050" marB="19050" anchor="b"/>
+                </a:tc>
+                <a:tc>
+                  <a:txBody>
+                    <a:bodyPr/>
+                    <a:lstStyle/>
+                    <a:p>
+                      <a:pPr algn="r" rtl="0" fontAlgn="b"/>
+                      <a:r>
+                        <a:rPr lang="en-US" sz="1600" b="0">
+                          <a:effectLst/>
+                        </a:rPr>
+                        <a:t>2500</a:t>
+                      </a:r>
+                    </a:p>
+                  </a:txBody>
+                  <a:tcPr marL="28575" marR="28575" marT="19050" marB="19050" anchor="b"/>
+                </a:tc>
+                <a:tc>
+                  <a:txBody>
+                    <a:bodyPr/>
+                    <a:lstStyle/>
+                    <a:p>
+                      <a:pPr algn="r" rtl="0" fontAlgn="b"/>
+                      <a:r>
+                        <a:rPr lang="en-US" sz="1600" b="0">
+                          <a:effectLst/>
+                        </a:rPr>
+                        <a:t>169</a:t>
+                      </a:r>
+                    </a:p>
+                  </a:txBody>
+                  <a:tcPr marL="28575" marR="28575" marT="19050" marB="19050" anchor="b"/>
+                </a:tc>
+                <a:tc>
+                  <a:txBody>
+                    <a:bodyPr/>
+                    <a:lstStyle/>
+                    <a:p>
+                      <a:pPr algn="r" rtl="0" fontAlgn="b"/>
+                      <a:r>
+                        <a:rPr lang="en-US" sz="1600" b="0">
+                          <a:effectLst/>
+                        </a:rPr>
+                        <a:t>27/38/35</a:t>
+                      </a:r>
+                    </a:p>
+                  </a:txBody>
+                  <a:tcPr marL="28575" marR="28575" marT="19050" marB="19050" anchor="b"/>
+                </a:tc>
+                <a:tc>
+                  <a:txBody>
+                    <a:bodyPr/>
+                    <a:lstStyle/>
+                    <a:p>
+                      <a:pPr algn="r" rtl="0" fontAlgn="b"/>
+                      <a:r>
+                        <a:rPr lang="en-US" sz="1600" b="0">
+                          <a:effectLst/>
+                        </a:rPr>
+                        <a:t>13</a:t>
+                      </a:r>
+                    </a:p>
+                  </a:txBody>
+                  <a:tcPr marL="28575" marR="28575" marT="19050" marB="19050" anchor="b"/>
+                </a:tc>
+                <a:tc>
+                  <a:txBody>
+                    <a:bodyPr/>
+                    <a:lstStyle/>
+                    <a:p>
+                      <a:pPr algn="r" rtl="0" fontAlgn="b"/>
+                      <a:r>
+                        <a:rPr lang="en-US" sz="1600" b="0">
+                          <a:effectLst/>
+                        </a:rPr>
+                        <a:t>2.5</a:t>
+                      </a:r>
+                    </a:p>
+                  </a:txBody>
+                  <a:tcPr marL="28575" marR="28575" marT="19050" marB="19050" anchor="b"/>
+                </a:tc>
+                <a:extLst>
+                  <a:ext uri="{0D108BD9-81ED-4DB2-BD59-A6C34878D82A}">
+                    <a16:rowId xmlns:a16="http://schemas.microsoft.com/office/drawing/2014/main" val="1392887536"/>
+                  </a:ext>
+                </a:extLst>
+              </a:tr>
+              <a:tr h="413127">
+                <a:tc>
+                  <a:txBody>
+                    <a:bodyPr/>
+                    <a:lstStyle/>
+                    <a:p>
+                      <a:pPr rtl="0" fontAlgn="b"/>
+                      <a:r>
+                        <a:rPr lang="en-US" sz="1600" b="1">
+                          <a:effectLst/>
+                        </a:rPr>
+                        <a:t>Deer Valley</a:t>
+                      </a:r>
+                    </a:p>
+                  </a:txBody>
+                  <a:tcPr marL="28575" marR="28575" marT="19050" marB="19050" anchor="b"/>
+                </a:tc>
+                <a:tc>
+                  <a:txBody>
+                    <a:bodyPr/>
+                    <a:lstStyle/>
+                    <a:p>
+                      <a:pPr rtl="0" fontAlgn="b"/>
+                      <a:r>
+                        <a:rPr lang="en-US" sz="1600" b="1">
+                          <a:effectLst/>
+                        </a:rPr>
+                        <a:t>Utah</a:t>
+                      </a:r>
+                    </a:p>
+                  </a:txBody>
+                  <a:tcPr marL="28575" marR="28575" marT="19050" marB="19050" anchor="b"/>
+                </a:tc>
+                <a:tc>
+                  <a:txBody>
+                    <a:bodyPr/>
+                    <a:lstStyle/>
+                    <a:p>
+                      <a:pPr algn="r" rtl="0" fontAlgn="b"/>
+                      <a:r>
+                        <a:rPr lang="en-US" sz="1600" b="0">
+                          <a:effectLst/>
+                        </a:rPr>
+                        <a:t>300</a:t>
+                      </a:r>
+                    </a:p>
+                  </a:txBody>
+                  <a:tcPr marL="28575" marR="28575" marT="19050" marB="19050" anchor="b"/>
+                </a:tc>
+                <a:tc>
+                  <a:txBody>
+                    <a:bodyPr/>
+                    <a:lstStyle/>
+                    <a:p>
+                      <a:pPr algn="r" rtl="0" fontAlgn="b"/>
+                      <a:r>
+                        <a:rPr lang="en-US" sz="1600" b="0">
+                          <a:effectLst/>
+                        </a:rPr>
+                        <a:t>3000</a:t>
+                      </a:r>
+                    </a:p>
+                  </a:txBody>
+                  <a:tcPr marL="28575" marR="28575" marT="19050" marB="19050" anchor="b"/>
+                </a:tc>
+                <a:tc>
+                  <a:txBody>
+                    <a:bodyPr/>
+                    <a:lstStyle/>
+                    <a:p>
+                      <a:pPr algn="r" rtl="0" fontAlgn="b"/>
+                      <a:r>
+                        <a:rPr lang="en-US" sz="1600" b="0">
+                          <a:effectLst/>
+                        </a:rPr>
+                        <a:t>6570</a:t>
+                      </a:r>
+                    </a:p>
+                  </a:txBody>
+                  <a:tcPr marL="28575" marR="28575" marT="19050" marB="19050" anchor="b"/>
+                </a:tc>
+                <a:tc>
+                  <a:txBody>
+                    <a:bodyPr/>
+                    <a:lstStyle/>
+                    <a:p>
+                      <a:pPr algn="r" rtl="0" fontAlgn="b"/>
+                      <a:r>
+                        <a:rPr lang="en-US" sz="1600" b="0">
+                          <a:effectLst/>
+                        </a:rPr>
+                        <a:t>9570</a:t>
+                      </a:r>
+                    </a:p>
+                  </a:txBody>
+                  <a:tcPr marL="28575" marR="28575" marT="19050" marB="19050" anchor="b"/>
+                </a:tc>
+                <a:tc>
+                  <a:txBody>
+                    <a:bodyPr/>
+                    <a:lstStyle/>
+                    <a:p>
+                      <a:pPr algn="r" rtl="0" fontAlgn="b"/>
+                      <a:r>
+                        <a:rPr lang="en-US" sz="1600" b="0">
+                          <a:effectLst/>
+                        </a:rPr>
+                        <a:t>2026</a:t>
+                      </a:r>
+                    </a:p>
+                  </a:txBody>
+                  <a:tcPr marL="28575" marR="28575" marT="19050" marB="19050" anchor="b"/>
+                </a:tc>
+                <a:tc>
+                  <a:txBody>
+                    <a:bodyPr/>
+                    <a:lstStyle/>
+                    <a:p>
+                      <a:pPr algn="r" rtl="0" fontAlgn="b"/>
+                      <a:r>
+                        <a:rPr lang="en-US" sz="1600" b="0">
+                          <a:effectLst/>
+                        </a:rPr>
+                        <a:t>103</a:t>
+                      </a:r>
+                    </a:p>
+                  </a:txBody>
+                  <a:tcPr marL="28575" marR="28575" marT="19050" marB="19050" anchor="b"/>
+                </a:tc>
+                <a:tc>
+                  <a:txBody>
+                    <a:bodyPr/>
+                    <a:lstStyle/>
+                    <a:p>
+                      <a:pPr algn="r" rtl="0" fontAlgn="b"/>
+                      <a:r>
+                        <a:rPr lang="en-US" sz="1600" b="0">
+                          <a:effectLst/>
+                        </a:rPr>
+                        <a:t>27/41/32</a:t>
+                      </a:r>
+                    </a:p>
+                  </a:txBody>
+                  <a:tcPr marL="28575" marR="28575" marT="19050" marB="19050" anchor="b"/>
+                </a:tc>
+                <a:tc>
+                  <a:txBody>
+                    <a:bodyPr/>
+                    <a:lstStyle/>
+                    <a:p>
+                      <a:pPr algn="r" rtl="0" fontAlgn="b"/>
+                      <a:r>
+                        <a:rPr lang="en-US" sz="1600" b="0">
+                          <a:effectLst/>
+                        </a:rPr>
+                        <a:t>24</a:t>
+                      </a:r>
+                    </a:p>
+                  </a:txBody>
+                  <a:tcPr marL="28575" marR="28575" marT="19050" marB="19050" anchor="b"/>
+                </a:tc>
+                <a:tc>
+                  <a:txBody>
+                    <a:bodyPr/>
+                    <a:lstStyle/>
+                    <a:p>
+                      <a:pPr algn="r" rtl="0" fontAlgn="b"/>
+                      <a:r>
+                        <a:rPr lang="en-US" sz="1600" b="0">
+                          <a:effectLst/>
+                        </a:rPr>
+                        <a:t>2.8</a:t>
+                      </a:r>
+                    </a:p>
+                  </a:txBody>
+                  <a:tcPr marL="28575" marR="28575" marT="19050" marB="19050" anchor="b"/>
+                </a:tc>
+                <a:extLst>
+                  <a:ext uri="{0D108BD9-81ED-4DB2-BD59-A6C34878D82A}">
+                    <a16:rowId xmlns:a16="http://schemas.microsoft.com/office/drawing/2014/main" val="2310940156"/>
+                  </a:ext>
+                </a:extLst>
+              </a:tr>
+              <a:tr h="413127">
+                <a:tc>
+                  <a:txBody>
+                    <a:bodyPr/>
+                    <a:lstStyle/>
+                    <a:p>
+                      <a:pPr rtl="0" fontAlgn="b"/>
+                      <a:r>
+                        <a:rPr lang="en-US" sz="1600" b="1">
+                          <a:effectLst/>
+                        </a:rPr>
+                        <a:t>Brighton</a:t>
+                      </a:r>
+                    </a:p>
+                  </a:txBody>
+                  <a:tcPr marL="28575" marR="28575" marT="19050" marB="19050" anchor="b"/>
+                </a:tc>
+                <a:tc>
+                  <a:txBody>
+                    <a:bodyPr/>
+                    <a:lstStyle/>
+                    <a:p>
+                      <a:pPr rtl="0" fontAlgn="b"/>
+                      <a:r>
+                        <a:rPr lang="en-US" sz="1600" b="1">
+                          <a:effectLst/>
+                        </a:rPr>
+                        <a:t>Utah</a:t>
+                      </a:r>
+                    </a:p>
+                  </a:txBody>
+                  <a:tcPr marL="28575" marR="28575" marT="19050" marB="19050" anchor="b"/>
+                </a:tc>
+                <a:tc>
+                  <a:txBody>
+                    <a:bodyPr/>
+                    <a:lstStyle/>
+                    <a:p>
+                      <a:pPr algn="r" rtl="0" fontAlgn="b"/>
+                      <a:r>
+                        <a:rPr lang="en-US" sz="1600" b="0">
+                          <a:effectLst/>
+                        </a:rPr>
+                        <a:t>500</a:t>
+                      </a:r>
+                    </a:p>
+                  </a:txBody>
+                  <a:tcPr marL="28575" marR="28575" marT="19050" marB="19050" anchor="b"/>
+                </a:tc>
+                <a:tc>
+                  <a:txBody>
+                    <a:bodyPr/>
+                    <a:lstStyle/>
+                    <a:p>
+                      <a:pPr algn="r" rtl="0" fontAlgn="b"/>
+                      <a:r>
+                        <a:rPr lang="en-US" sz="1600" b="0">
+                          <a:effectLst/>
+                        </a:rPr>
+                        <a:t>1750</a:t>
+                      </a:r>
+                    </a:p>
+                  </a:txBody>
+                  <a:tcPr marL="28575" marR="28575" marT="19050" marB="19050" anchor="b"/>
+                </a:tc>
+                <a:tc>
+                  <a:txBody>
+                    <a:bodyPr/>
+                    <a:lstStyle/>
+                    <a:p>
+                      <a:pPr algn="r" rtl="0" fontAlgn="b"/>
+                      <a:r>
+                        <a:rPr lang="en-US" sz="1600" b="0">
+                          <a:effectLst/>
+                        </a:rPr>
+                        <a:t>8755</a:t>
+                      </a:r>
+                    </a:p>
+                  </a:txBody>
+                  <a:tcPr marL="28575" marR="28575" marT="19050" marB="19050" anchor="b">
+                    <a:solidFill>
+                      <a:schemeClr val="accent1">
+                        <a:lumMod val="60000"/>
+                        <a:lumOff val="40000"/>
+                      </a:schemeClr>
+                    </a:solidFill>
+                  </a:tcPr>
+                </a:tc>
+                <a:tc>
+                  <a:txBody>
+                    <a:bodyPr/>
+                    <a:lstStyle/>
+                    <a:p>
+                      <a:pPr algn="r" rtl="0" fontAlgn="b"/>
+                      <a:r>
+                        <a:rPr lang="en-US" sz="1600" b="0">
+                          <a:effectLst/>
+                        </a:rPr>
+                        <a:t>10750</a:t>
+                      </a:r>
+                    </a:p>
+                  </a:txBody>
+                  <a:tcPr marL="28575" marR="28575" marT="19050" marB="19050" anchor="b"/>
+                </a:tc>
+                <a:tc>
+                  <a:txBody>
+                    <a:bodyPr/>
+                    <a:lstStyle/>
+                    <a:p>
+                      <a:pPr algn="r" rtl="0" fontAlgn="b"/>
+                      <a:r>
+                        <a:rPr lang="en-US" sz="1600" b="0">
+                          <a:effectLst/>
+                        </a:rPr>
+                        <a:t>1050</a:t>
+                      </a:r>
+                    </a:p>
+                  </a:txBody>
+                  <a:tcPr marL="28575" marR="28575" marT="19050" marB="19050" anchor="b"/>
+                </a:tc>
+                <a:tc>
+                  <a:txBody>
+                    <a:bodyPr/>
+                    <a:lstStyle/>
+                    <a:p>
+                      <a:pPr algn="r" rtl="0" fontAlgn="b"/>
+                      <a:r>
+                        <a:rPr lang="en-US" sz="1600" b="0">
+                          <a:effectLst/>
+                        </a:rPr>
+                        <a:t>66</a:t>
+                      </a:r>
+                    </a:p>
+                  </a:txBody>
+                  <a:tcPr marL="28575" marR="28575" marT="19050" marB="19050" anchor="b"/>
+                </a:tc>
+                <a:tc>
+                  <a:txBody>
+                    <a:bodyPr/>
+                    <a:lstStyle/>
+                    <a:p>
+                      <a:pPr algn="r" rtl="0" fontAlgn="b"/>
+                      <a:r>
+                        <a:rPr lang="en-US" sz="1600" b="0">
+                          <a:effectLst/>
+                        </a:rPr>
+                        <a:t>21/40/39</a:t>
+                      </a:r>
+                    </a:p>
+                  </a:txBody>
+                  <a:tcPr marL="28575" marR="28575" marT="19050" marB="19050" anchor="b"/>
+                </a:tc>
+                <a:tc>
+                  <a:txBody>
+                    <a:bodyPr/>
+                    <a:lstStyle/>
+                    <a:p>
+                      <a:pPr algn="r" rtl="0" fontAlgn="b"/>
+                      <a:r>
+                        <a:rPr lang="en-US" sz="1600" b="0">
+                          <a:effectLst/>
+                        </a:rPr>
+                        <a:t>6</a:t>
+                      </a:r>
+                    </a:p>
+                  </a:txBody>
+                  <a:tcPr marL="28575" marR="28575" marT="19050" marB="19050" anchor="b"/>
+                </a:tc>
+                <a:tc>
+                  <a:txBody>
+                    <a:bodyPr/>
+                    <a:lstStyle/>
+                    <a:p>
+                      <a:pPr algn="r" rtl="0" fontAlgn="b"/>
+                      <a:r>
+                        <a:rPr lang="en-US" sz="1600" b="0">
+                          <a:effectLst/>
+                        </a:rPr>
+                        <a:t>1.2</a:t>
+                      </a:r>
+                    </a:p>
+                  </a:txBody>
+                  <a:tcPr marL="28575" marR="28575" marT="19050" marB="19050" anchor="b"/>
+                </a:tc>
+                <a:extLst>
+                  <a:ext uri="{0D108BD9-81ED-4DB2-BD59-A6C34878D82A}">
+                    <a16:rowId xmlns:a16="http://schemas.microsoft.com/office/drawing/2014/main" val="2744995995"/>
+                  </a:ext>
+                </a:extLst>
+              </a:tr>
+              <a:tr h="413127">
+                <a:tc>
+                  <a:txBody>
+                    <a:bodyPr/>
+                    <a:lstStyle/>
+                    <a:p>
+                      <a:pPr rtl="0" fontAlgn="b"/>
+                      <a:r>
+                        <a:rPr lang="en-US" sz="1600" b="1">
+                          <a:effectLst/>
+                        </a:rPr>
+                        <a:t>Solitude</a:t>
+                      </a:r>
+                    </a:p>
+                  </a:txBody>
+                  <a:tcPr marL="28575" marR="28575" marT="19050" marB="19050" anchor="b"/>
+                </a:tc>
+                <a:tc>
+                  <a:txBody>
+                    <a:bodyPr/>
+                    <a:lstStyle/>
+                    <a:p>
+                      <a:pPr rtl="0" fontAlgn="b"/>
+                      <a:r>
+                        <a:rPr lang="en-US" sz="1600" b="1">
+                          <a:effectLst/>
+                        </a:rPr>
+                        <a:t>Utah</a:t>
+                      </a:r>
+                    </a:p>
+                  </a:txBody>
+                  <a:tcPr marL="28575" marR="28575" marT="19050" marB="19050" anchor="b"/>
+                </a:tc>
+                <a:tc>
+                  <a:txBody>
+                    <a:bodyPr/>
+                    <a:lstStyle/>
+                    <a:p>
+                      <a:pPr algn="r" rtl="0" fontAlgn="b"/>
+                      <a:r>
+                        <a:rPr lang="en-US" sz="1600" b="0">
+                          <a:effectLst/>
+                        </a:rPr>
+                        <a:t>500</a:t>
+                      </a:r>
+                    </a:p>
+                  </a:txBody>
+                  <a:tcPr marL="28575" marR="28575" marT="19050" marB="19050" anchor="b"/>
+                </a:tc>
+                <a:tc>
+                  <a:txBody>
+                    <a:bodyPr/>
+                    <a:lstStyle/>
+                    <a:p>
+                      <a:pPr algn="r" rtl="0" fontAlgn="b"/>
+                      <a:r>
+                        <a:rPr lang="en-US" sz="1600" b="0">
+                          <a:effectLst/>
+                        </a:rPr>
+                        <a:t>2494</a:t>
+                      </a:r>
+                    </a:p>
+                  </a:txBody>
+                  <a:tcPr marL="28575" marR="28575" marT="19050" marB="19050" anchor="b"/>
+                </a:tc>
+                <a:tc>
+                  <a:txBody>
+                    <a:bodyPr/>
+                    <a:lstStyle/>
+                    <a:p>
+                      <a:pPr algn="r" rtl="0" fontAlgn="b"/>
+                      <a:r>
+                        <a:rPr lang="en-US" sz="1600" b="0">
+                          <a:effectLst/>
+                        </a:rPr>
+                        <a:t>7988</a:t>
+                      </a:r>
+                    </a:p>
+                  </a:txBody>
+                  <a:tcPr marL="28575" marR="28575" marT="19050" marB="19050" anchor="b"/>
+                </a:tc>
+                <a:tc>
+                  <a:txBody>
+                    <a:bodyPr/>
+                    <a:lstStyle/>
+                    <a:p>
+                      <a:pPr algn="r" rtl="0" fontAlgn="b"/>
+                      <a:r>
+                        <a:rPr lang="en-US" sz="1600" b="0">
+                          <a:effectLst/>
+                        </a:rPr>
+                        <a:t>10488</a:t>
+                      </a:r>
+                    </a:p>
+                  </a:txBody>
+                  <a:tcPr marL="28575" marR="28575" marT="19050" marB="19050" anchor="b"/>
+                </a:tc>
+                <a:tc>
+                  <a:txBody>
+                    <a:bodyPr/>
+                    <a:lstStyle/>
+                    <a:p>
+                      <a:pPr algn="r" rtl="0" fontAlgn="b"/>
+                      <a:r>
+                        <a:rPr lang="en-US" sz="1600" b="0">
+                          <a:effectLst/>
+                        </a:rPr>
+                        <a:t>1200</a:t>
+                      </a:r>
+                    </a:p>
+                  </a:txBody>
+                  <a:tcPr marL="28575" marR="28575" marT="19050" marB="19050" anchor="b"/>
+                </a:tc>
+                <a:tc>
+                  <a:txBody>
+                    <a:bodyPr/>
+                    <a:lstStyle/>
+                    <a:p>
+                      <a:pPr algn="r" rtl="0" fontAlgn="b"/>
+                      <a:r>
+                        <a:rPr lang="en-US" sz="1600" b="0">
+                          <a:effectLst/>
+                        </a:rPr>
+                        <a:t>80</a:t>
+                      </a:r>
+                    </a:p>
+                  </a:txBody>
+                  <a:tcPr marL="28575" marR="28575" marT="19050" marB="19050" anchor="b"/>
+                </a:tc>
+                <a:tc>
+                  <a:txBody>
+                    <a:bodyPr/>
+                    <a:lstStyle/>
+                    <a:p>
+                      <a:pPr algn="r" rtl="0" fontAlgn="b"/>
+                      <a:r>
+                        <a:rPr lang="en-US" sz="1600" b="0">
+                          <a:effectLst/>
+                        </a:rPr>
+                        <a:t>10/40/50</a:t>
+                      </a:r>
+                    </a:p>
+                  </a:txBody>
+                  <a:tcPr marL="28575" marR="28575" marT="19050" marB="19050" anchor="b"/>
+                </a:tc>
+                <a:tc>
+                  <a:txBody>
+                    <a:bodyPr/>
+                    <a:lstStyle/>
+                    <a:p>
+                      <a:pPr algn="r" rtl="0" fontAlgn="b"/>
+                      <a:r>
+                        <a:rPr lang="en-US" sz="1600" b="0">
+                          <a:effectLst/>
+                        </a:rPr>
+                        <a:t>8</a:t>
+                      </a:r>
+                    </a:p>
+                  </a:txBody>
+                  <a:tcPr marL="28575" marR="28575" marT="19050" marB="19050" anchor="b"/>
+                </a:tc>
+                <a:tc>
+                  <a:txBody>
+                    <a:bodyPr/>
+                    <a:lstStyle/>
+                    <a:p>
+                      <a:pPr algn="r" rtl="0" fontAlgn="b"/>
+                      <a:r>
+                        <a:rPr lang="en-US" sz="1600" b="0">
+                          <a:effectLst/>
+                        </a:rPr>
+                        <a:t>3.5</a:t>
+                      </a:r>
+                    </a:p>
+                  </a:txBody>
+                  <a:tcPr marL="28575" marR="28575" marT="19050" marB="19050" anchor="b"/>
+                </a:tc>
+                <a:extLst>
+                  <a:ext uri="{0D108BD9-81ED-4DB2-BD59-A6C34878D82A}">
+                    <a16:rowId xmlns:a16="http://schemas.microsoft.com/office/drawing/2014/main" val="4069060244"/>
+                  </a:ext>
+                </a:extLst>
+              </a:tr>
+              <a:tr h="413127">
+                <a:tc>
+                  <a:txBody>
+                    <a:bodyPr/>
+                    <a:lstStyle/>
+                    <a:p>
+                      <a:pPr rtl="0" fontAlgn="b"/>
+                      <a:r>
+                        <a:rPr lang="en-US" sz="1600" b="1">
+                          <a:effectLst/>
+                        </a:rPr>
+                        <a:t>Steamboat</a:t>
+                      </a:r>
+                    </a:p>
+                  </a:txBody>
+                  <a:tcPr marL="28575" marR="28575" marT="19050" marB="19050" anchor="b"/>
+                </a:tc>
+                <a:tc>
+                  <a:txBody>
+                    <a:bodyPr/>
+                    <a:lstStyle/>
+                    <a:p>
+                      <a:pPr rtl="0" fontAlgn="b"/>
+                      <a:r>
+                        <a:rPr lang="en-US" sz="1600" b="1">
+                          <a:effectLst/>
+                        </a:rPr>
+                        <a:t>Colorado</a:t>
+                      </a:r>
+                    </a:p>
+                  </a:txBody>
+                  <a:tcPr marL="28575" marR="28575" marT="19050" marB="19050" anchor="b"/>
+                </a:tc>
+                <a:tc>
+                  <a:txBody>
+                    <a:bodyPr/>
+                    <a:lstStyle/>
+                    <a:p>
+                      <a:pPr algn="r" rtl="0" fontAlgn="b"/>
+                      <a:r>
+                        <a:rPr lang="en-US" sz="1600" b="0">
+                          <a:effectLst/>
+                        </a:rPr>
+                        <a:t>400</a:t>
+                      </a:r>
+                    </a:p>
+                  </a:txBody>
+                  <a:tcPr marL="28575" marR="28575" marT="19050" marB="19050" anchor="b"/>
+                </a:tc>
+                <a:tc>
+                  <a:txBody>
+                    <a:bodyPr/>
+                    <a:lstStyle/>
+                    <a:p>
+                      <a:pPr algn="r" rtl="0" fontAlgn="b"/>
+                      <a:r>
+                        <a:rPr lang="en-US" sz="1600" b="0">
+                          <a:effectLst/>
+                        </a:rPr>
+                        <a:t>3668</a:t>
+                      </a:r>
+                    </a:p>
+                  </a:txBody>
+                  <a:tcPr marL="28575" marR="28575" marT="19050" marB="19050" anchor="b"/>
+                </a:tc>
+                <a:tc>
+                  <a:txBody>
+                    <a:bodyPr/>
+                    <a:lstStyle/>
+                    <a:p>
+                      <a:pPr algn="r" rtl="0" fontAlgn="b"/>
+                      <a:r>
+                        <a:rPr lang="en-US" sz="1600" b="0">
+                          <a:effectLst/>
+                        </a:rPr>
+                        <a:t>6900</a:t>
+                      </a:r>
+                    </a:p>
+                  </a:txBody>
+                  <a:tcPr marL="28575" marR="28575" marT="19050" marB="19050" anchor="b"/>
+                </a:tc>
+                <a:tc>
+                  <a:txBody>
+                    <a:bodyPr/>
+                    <a:lstStyle/>
+                    <a:p>
+                      <a:pPr algn="r" rtl="0" fontAlgn="b"/>
+                      <a:r>
+                        <a:rPr lang="en-US" sz="1600" b="0">
+                          <a:effectLst/>
+                        </a:rPr>
+                        <a:t>10568</a:t>
+                      </a:r>
+                    </a:p>
+                  </a:txBody>
+                  <a:tcPr marL="28575" marR="28575" marT="19050" marB="19050" anchor="b"/>
+                </a:tc>
+                <a:tc>
+                  <a:txBody>
+                    <a:bodyPr/>
+                    <a:lstStyle/>
+                    <a:p>
+                      <a:pPr algn="r" rtl="0" fontAlgn="b"/>
+                      <a:r>
+                        <a:rPr lang="en-US" sz="1600" b="0">
+                          <a:effectLst/>
+                        </a:rPr>
+                        <a:t>2965</a:t>
+                      </a:r>
+                    </a:p>
+                  </a:txBody>
+                  <a:tcPr marL="28575" marR="28575" marT="19050" marB="19050" anchor="b"/>
+                </a:tc>
+                <a:tc>
+                  <a:txBody>
+                    <a:bodyPr/>
+                    <a:lstStyle/>
+                    <a:p>
+                      <a:pPr algn="r" rtl="0" fontAlgn="b"/>
+                      <a:r>
+                        <a:rPr lang="en-US" sz="1600" b="0">
+                          <a:effectLst/>
+                        </a:rPr>
+                        <a:t>23</a:t>
+                      </a:r>
+                    </a:p>
+                  </a:txBody>
+                  <a:tcPr marL="28575" marR="28575" marT="19050" marB="19050" anchor="b"/>
+                </a:tc>
+                <a:tc>
+                  <a:txBody>
+                    <a:bodyPr/>
+                    <a:lstStyle/>
+                    <a:p>
+                      <a:pPr algn="r" rtl="0" fontAlgn="b"/>
+                      <a:r>
+                        <a:rPr lang="en-US" sz="1600" b="0">
+                          <a:effectLst/>
+                        </a:rPr>
+                        <a:t>14/42/44</a:t>
+                      </a:r>
+                    </a:p>
+                  </a:txBody>
+                  <a:tcPr marL="28575" marR="28575" marT="19050" marB="19050" anchor="b"/>
+                </a:tc>
+                <a:tc>
+                  <a:txBody>
+                    <a:bodyPr/>
+                    <a:lstStyle/>
+                    <a:p>
+                      <a:pPr algn="r" rtl="0" fontAlgn="b"/>
+                      <a:r>
+                        <a:rPr lang="en-US" sz="1600" b="0">
+                          <a:effectLst/>
+                        </a:rPr>
+                        <a:t>23</a:t>
+                      </a:r>
+                    </a:p>
+                  </a:txBody>
+                  <a:tcPr marL="28575" marR="28575" marT="19050" marB="19050" anchor="b"/>
+                </a:tc>
+                <a:tc>
+                  <a:txBody>
+                    <a:bodyPr/>
+                    <a:lstStyle/>
+                    <a:p>
+                      <a:pPr algn="r" rtl="0" fontAlgn="b"/>
+                      <a:r>
+                        <a:rPr lang="en-US" sz="1600" b="0">
+                          <a:effectLst/>
+                        </a:rPr>
+                        <a:t>3</a:t>
+                      </a:r>
+                    </a:p>
+                  </a:txBody>
+                  <a:tcPr marL="28575" marR="28575" marT="19050" marB="19050" anchor="b"/>
+                </a:tc>
+                <a:extLst>
+                  <a:ext uri="{0D108BD9-81ED-4DB2-BD59-A6C34878D82A}">
+                    <a16:rowId xmlns:a16="http://schemas.microsoft.com/office/drawing/2014/main" val="4223011940"/>
+                  </a:ext>
+                </a:extLst>
+              </a:tr>
+            </a:tbl>
+          </a:graphicData>
+        </a:graphic>
+      </p:graphicFrame>
     </p:spTree>
     <p:extLst>
       <p:ext uri="{BB962C8B-B14F-4D97-AF65-F5344CB8AC3E}">
-        <p14:creationId xmlns:p14="http://schemas.microsoft.com/office/powerpoint/2010/main" val="265580516"/>
+        <p14:creationId xmlns:p14="http://schemas.microsoft.com/office/powerpoint/2010/main" val="3504312909"/>
       </p:ext>
     </p:extLst>
   </p:cSld>

</xml_diff>